<commit_message>
Updated the report document
</commit_message>
<xml_diff>
--- a/ML_TAKEHOME_PROJECT-REPORT.pptx
+++ b/ML_TAKEHOME_PROJECT-REPORT.pptx
@@ -128,9 +128,125 @@
 <p1510:revInfo xmlns:a="http://schemas.openxmlformats.org/drawingml/2006/main" xmlns:r="http://schemas.openxmlformats.org/officeDocument/2006/relationships" xmlns:p1510="http://schemas.microsoft.com/office/powerpoint/2015/10/main">
   <p1510:revLst>
     <p1510:client id="{31132351-454E-1A48-B42A-DC7063C6F178}" v="114" dt="2026-02-19T17:14:45.364"/>
+    <p1510:client id="{AE069164-220B-0049-A57E-61965DED5C62}" v="1" dt="2026-02-19T18:23:05.475"/>
     <p1510:client id="{FAE7ECCA-25BA-4320-B590-B24275B56522}" v="135" dt="2026-02-19T12:16:49.599"/>
   </p1510:revLst>
 </p1510:revInfo>
+</file>
+
+<file path=ppt/changesInfos/changesInfo1.xml><?xml version="1.0" encoding="utf-8"?>
+<pc:chgInfo xmlns:a="http://schemas.openxmlformats.org/drawingml/2006/main" xmlns:r="http://schemas.openxmlformats.org/officeDocument/2006/relationships" xmlns:ac="http://schemas.microsoft.com/office/drawing/2013/main/command" xmlns:pc="http://schemas.microsoft.com/office/powerpoint/2013/main/command">
+  <pc:docChgLst>
+    <pc:chgData name="Edison E. Chukwuemeka" userId="211098e446733d4d" providerId="LiveId" clId="{D68C25D6-6AAD-5562-A0DF-D61B58AE280A}"/>
+    <pc:docChg chg="undo custSel modSld">
+      <pc:chgData name="Edison E. Chukwuemeka" userId="211098e446733d4d" providerId="LiveId" clId="{D68C25D6-6AAD-5562-A0DF-D61B58AE280A}" dt="2026-02-19T18:31:28.965" v="37" actId="14100"/>
+      <pc:docMkLst>
+        <pc:docMk/>
+      </pc:docMkLst>
+      <pc:sldChg chg="modSp mod">
+        <pc:chgData name="Edison E. Chukwuemeka" userId="211098e446733d4d" providerId="LiveId" clId="{D68C25D6-6AAD-5562-A0DF-D61B58AE280A}" dt="2026-02-19T18:23:09.475" v="13"/>
+        <pc:sldMkLst>
+          <pc:docMk/>
+          <pc:sldMk cId="524626657" sldId="256"/>
+        </pc:sldMkLst>
+        <pc:spChg chg="mod">
+          <ac:chgData name="Edison E. Chukwuemeka" userId="211098e446733d4d" providerId="LiveId" clId="{D68C25D6-6AAD-5562-A0DF-D61B58AE280A}" dt="2026-02-19T18:23:09.475" v="13"/>
+          <ac:spMkLst>
+            <pc:docMk/>
+            <pc:sldMk cId="524626657" sldId="256"/>
+            <ac:spMk id="10" creationId="{EC83F4FC-33A4-17B4-E8A5-0378D0EFB8DC}"/>
+          </ac:spMkLst>
+        </pc:spChg>
+        <pc:spChg chg="mod">
+          <ac:chgData name="Edison E. Chukwuemeka" userId="211098e446733d4d" providerId="LiveId" clId="{D68C25D6-6AAD-5562-A0DF-D61B58AE280A}" dt="2026-02-19T18:22:47.387" v="11" actId="20577"/>
+          <ac:spMkLst>
+            <pc:docMk/>
+            <pc:sldMk cId="524626657" sldId="256"/>
+            <ac:spMk id="12" creationId="{BB94D3B0-B10C-4005-3F7F-61283CA15044}"/>
+          </ac:spMkLst>
+        </pc:spChg>
+      </pc:sldChg>
+      <pc:sldChg chg="modSp mod">
+        <pc:chgData name="Edison E. Chukwuemeka" userId="211098e446733d4d" providerId="LiveId" clId="{D68C25D6-6AAD-5562-A0DF-D61B58AE280A}" dt="2026-02-19T18:31:28.965" v="37" actId="14100"/>
+        <pc:sldMkLst>
+          <pc:docMk/>
+          <pc:sldMk cId="3374306355" sldId="257"/>
+        </pc:sldMkLst>
+        <pc:spChg chg="mod">
+          <ac:chgData name="Edison E. Chukwuemeka" userId="211098e446733d4d" providerId="LiveId" clId="{D68C25D6-6AAD-5562-A0DF-D61B58AE280A}" dt="2026-02-19T18:30:12.488" v="29" actId="15"/>
+          <ac:spMkLst>
+            <pc:docMk/>
+            <pc:sldMk cId="3374306355" sldId="257"/>
+            <ac:spMk id="83" creationId="{CF2AF97A-BE6F-8E50-3340-173152728170}"/>
+          </ac:spMkLst>
+        </pc:spChg>
+        <pc:spChg chg="mod">
+          <ac:chgData name="Edison E. Chukwuemeka" userId="211098e446733d4d" providerId="LiveId" clId="{D68C25D6-6AAD-5562-A0DF-D61B58AE280A}" dt="2026-02-19T18:30:18.575" v="31" actId="15"/>
+          <ac:spMkLst>
+            <pc:docMk/>
+            <pc:sldMk cId="3374306355" sldId="257"/>
+            <ac:spMk id="84" creationId="{A00C2724-AC5F-2577-80DD-C359AB95B862}"/>
+          </ac:spMkLst>
+        </pc:spChg>
+        <pc:spChg chg="mod">
+          <ac:chgData name="Edison E. Chukwuemeka" userId="211098e446733d4d" providerId="LiveId" clId="{D68C25D6-6AAD-5562-A0DF-D61B58AE280A}" dt="2026-02-19T18:30:03.481" v="25" actId="15"/>
+          <ac:spMkLst>
+            <pc:docMk/>
+            <pc:sldMk cId="3374306355" sldId="257"/>
+            <ac:spMk id="85" creationId="{B4866A88-7F29-227C-702A-0430E0A59C91}"/>
+          </ac:spMkLst>
+        </pc:spChg>
+        <pc:spChg chg="mod">
+          <ac:chgData name="Edison E. Chukwuemeka" userId="211098e446733d4d" providerId="LiveId" clId="{D68C25D6-6AAD-5562-A0DF-D61B58AE280A}" dt="2026-02-19T18:29:56.619" v="21" actId="15"/>
+          <ac:spMkLst>
+            <pc:docMk/>
+            <pc:sldMk cId="3374306355" sldId="257"/>
+            <ac:spMk id="86" creationId="{DD555FE7-8532-D85D-8FB2-538ED5CBC2F6}"/>
+          </ac:spMkLst>
+        </pc:spChg>
+        <pc:spChg chg="mod">
+          <ac:chgData name="Edison E. Chukwuemeka" userId="211098e446733d4d" providerId="LiveId" clId="{D68C25D6-6AAD-5562-A0DF-D61B58AE280A}" dt="2026-02-19T18:30:56.702" v="34" actId="108"/>
+          <ac:spMkLst>
+            <pc:docMk/>
+            <pc:sldMk cId="3374306355" sldId="257"/>
+            <ac:spMk id="87" creationId="{F87480E7-2769-38A4-F309-04D28715CE3B}"/>
+          </ac:spMkLst>
+        </pc:spChg>
+        <pc:spChg chg="mod">
+          <ac:chgData name="Edison E. Chukwuemeka" userId="211098e446733d4d" providerId="LiveId" clId="{D68C25D6-6AAD-5562-A0DF-D61B58AE280A}" dt="2026-02-19T18:31:14.868" v="35" actId="108"/>
+          <ac:spMkLst>
+            <pc:docMk/>
+            <pc:sldMk cId="3374306355" sldId="257"/>
+            <ac:spMk id="88" creationId="{67286142-B664-8DBA-5C47-9D68B6424B38}"/>
+          </ac:spMkLst>
+        </pc:spChg>
+        <pc:spChg chg="mod">
+          <ac:chgData name="Edison E. Chukwuemeka" userId="211098e446733d4d" providerId="LiveId" clId="{D68C25D6-6AAD-5562-A0DF-D61B58AE280A}" dt="2026-02-19T18:31:28.965" v="37" actId="14100"/>
+          <ac:spMkLst>
+            <pc:docMk/>
+            <pc:sldMk cId="3374306355" sldId="257"/>
+            <ac:spMk id="89" creationId="{BE318D60-83E2-4737-B2DF-F652EAECC22A}"/>
+          </ac:spMkLst>
+        </pc:spChg>
+      </pc:sldChg>
+      <pc:sldChg chg="modSp mod">
+        <pc:chgData name="Edison E. Chukwuemeka" userId="211098e446733d4d" providerId="LiveId" clId="{D68C25D6-6AAD-5562-A0DF-D61B58AE280A}" dt="2026-02-19T18:19:51.046" v="9" actId="113"/>
+        <pc:sldMkLst>
+          <pc:docMk/>
+          <pc:sldMk cId="471726603" sldId="266"/>
+        </pc:sldMkLst>
+        <pc:spChg chg="mod">
+          <ac:chgData name="Edison E. Chukwuemeka" userId="211098e446733d4d" providerId="LiveId" clId="{D68C25D6-6AAD-5562-A0DF-D61B58AE280A}" dt="2026-02-19T18:19:51.046" v="9" actId="113"/>
+          <ac:spMkLst>
+            <pc:docMk/>
+            <pc:sldMk cId="471726603" sldId="266"/>
+            <ac:spMk id="2" creationId="{2CF28928-2A7A-691B-E005-844A94C34995}"/>
+          </ac:spMkLst>
+        </pc:spChg>
+      </pc:sldChg>
+    </pc:docChg>
+  </pc:docChgLst>
+</pc:chgInfo>
 </file>
 
 <file path=ppt/notesMasters/notesMaster1.xml><?xml version="1.0" encoding="utf-8"?>
@@ -4439,7 +4555,7 @@
                     <a:schemeClr val="tx1"/>
                   </a:solidFill>
                 </a:rPr>
-                <a:t>95.23%</a:t>
+                <a:t>94.81%</a:t>
               </a:r>
             </a:p>
           </p:txBody>
@@ -4559,7 +4675,7 @@
                     <a:schemeClr val="tx1"/>
                   </a:solidFill>
                 </a:rPr>
-                <a:t>3</a:t>
+                <a:t>2</a:t>
               </a:r>
             </a:p>
           </p:txBody>
@@ -4731,12 +4847,21 @@
             <p:ph type="title"/>
           </p:nvPr>
         </p:nvSpPr>
-        <p:spPr/>
+        <p:spPr>
+          <a:xfrm>
+            <a:off x="985345" y="2425153"/>
+            <a:ext cx="10515600" cy="1325563"/>
+          </a:xfrm>
+        </p:spPr>
         <p:txBody>
           <a:bodyPr/>
           <a:lstStyle/>
           <a:p>
-            <a:endParaRPr lang="en-US" dirty="0"/>
+            <a:pPr algn="ctr"/>
+            <a:r>
+              <a:rPr lang="en-US" b="1" dirty="0"/>
+              <a:t>THANKS</a:t>
+            </a:r>
           </a:p>
         </p:txBody>
       </p:sp>
@@ -5022,7 +5147,7 @@
         <p:spPr>
           <a:xfrm>
             <a:off x="1189703" y="1288023"/>
-            <a:ext cx="4552336" cy="648929"/>
+            <a:ext cx="4824598" cy="648929"/>
           </a:xfrm>
           <a:prstGeom prst="roundRect">
             <a:avLst/>
@@ -5053,10 +5178,10 @@
             </a:r>
           </a:p>
           <a:p>
-            <a:r>
-              <a:rPr lang="en-US" b="1" dirty="0"/>
-              <a:t>	</a:t>
-            </a:r>
+            <a:pPr marL="742950" lvl="1" indent="-285750">
+              <a:buFont typeface="Arial" panose="020B0604020202020204" pitchFamily="34" charset="0"/>
+              <a:buChar char="•"/>
+            </a:pPr>
             <a:r>
               <a:rPr lang="en-US" dirty="0"/>
               <a:t>Key Findings and Business Takeaways</a:t>
@@ -5079,7 +5204,7 @@
         <p:spPr>
           <a:xfrm>
             <a:off x="1189703" y="2062234"/>
-            <a:ext cx="4552336" cy="648929"/>
+            <a:ext cx="4906296" cy="648929"/>
           </a:xfrm>
           <a:prstGeom prst="roundRect">
             <a:avLst/>
@@ -5110,15 +5235,11 @@
             </a:r>
           </a:p>
           <a:p>
-            <a:pPr marL="285750" indent="-285750">
+            <a:pPr marL="742950" lvl="1" indent="-285750">
               <a:buFont typeface="Arial" panose="020B0604020202020204" pitchFamily="34" charset="0"/>
               <a:buChar char="•"/>
             </a:pPr>
             <a:r>
-              <a:rPr lang="en-US" b="1" dirty="0"/>
-              <a:t>	</a:t>
-            </a:r>
-            <a:r>
               <a:rPr lang="en-US" dirty="0"/>
               <a:t>Objective, Dataset and Project Scope</a:t>
             </a:r>
@@ -5139,8 +5260,8 @@
         </p:nvSpPr>
         <p:spPr>
           <a:xfrm>
-            <a:off x="1189703" y="2846274"/>
-            <a:ext cx="4552336" cy="1936954"/>
+            <a:off x="1189702" y="2846274"/>
+            <a:ext cx="4906297" cy="1936954"/>
           </a:xfrm>
           <a:prstGeom prst="roundRect">
             <a:avLst/>
@@ -5171,7 +5292,7 @@
             </a:r>
           </a:p>
           <a:p>
-            <a:pPr marL="285750" indent="-285750">
+            <a:pPr marL="742950" lvl="1" indent="-285750">
               <a:buFont typeface="Arial" panose="020B0604020202020204" pitchFamily="34" charset="0"/>
               <a:buChar char="•"/>
             </a:pPr>
@@ -5181,7 +5302,7 @@
             </a:r>
           </a:p>
           <a:p>
-            <a:pPr marL="285750" indent="-285750">
+            <a:pPr marL="742950" lvl="1" indent="-285750">
               <a:buFont typeface="Arial" panose="020B0604020202020204" pitchFamily="34" charset="0"/>
               <a:buChar char="•"/>
             </a:pPr>
@@ -5191,7 +5312,7 @@
             </a:r>
           </a:p>
           <a:p>
-            <a:pPr marL="285750" indent="-285750">
+            <a:pPr marL="742950" lvl="1" indent="-285750">
               <a:buFont typeface="Arial" panose="020B0604020202020204" pitchFamily="34" charset="0"/>
               <a:buChar char="•"/>
             </a:pPr>
@@ -5201,7 +5322,7 @@
             </a:r>
           </a:p>
           <a:p>
-            <a:pPr marL="285750" indent="-285750">
+            <a:pPr marL="742950" lvl="1" indent="-285750">
               <a:buFont typeface="Arial" panose="020B0604020202020204" pitchFamily="34" charset="0"/>
               <a:buChar char="•"/>
             </a:pPr>
@@ -5234,7 +5355,7 @@
         <p:spPr>
           <a:xfrm>
             <a:off x="1189703" y="4918339"/>
-            <a:ext cx="4552336" cy="1445342"/>
+            <a:ext cx="4906296" cy="1445342"/>
           </a:xfrm>
           <a:prstGeom prst="roundRect">
             <a:avLst/>
@@ -5265,7 +5386,7 @@
             </a:r>
           </a:p>
           <a:p>
-            <a:pPr marL="285750" indent="-285750">
+            <a:pPr marL="742950" lvl="1" indent="-285750">
               <a:buFont typeface="Arial" panose="020B0604020202020204" pitchFamily="34" charset="0"/>
               <a:buChar char="•"/>
             </a:pPr>
@@ -5275,7 +5396,7 @@
             </a:r>
           </a:p>
           <a:p>
-            <a:pPr marL="285750" indent="-285750">
+            <a:pPr marL="742950" lvl="1" indent="-285750">
               <a:buFont typeface="Arial" panose="020B0604020202020204" pitchFamily="34" charset="0"/>
               <a:buChar char="•"/>
             </a:pPr>
@@ -5285,7 +5406,7 @@
             </a:r>
           </a:p>
           <a:p>
-            <a:pPr marL="285750" indent="-285750">
+            <a:pPr marL="742950" lvl="1" indent="-285750">
               <a:buFont typeface="Arial" panose="020B0604020202020204" pitchFamily="34" charset="0"/>
               <a:buChar char="•"/>
             </a:pPr>
@@ -5295,7 +5416,7 @@
             </a:r>
           </a:p>
           <a:p>
-            <a:pPr marL="285750" indent="-285750">
+            <a:pPr marL="742950" lvl="1" indent="-285750">
               <a:buFont typeface="Arial" panose="020B0604020202020204" pitchFamily="34" charset="0"/>
               <a:buChar char="•"/>
             </a:pPr>
@@ -5353,7 +5474,7 @@
             </a:r>
           </a:p>
           <a:p>
-            <a:pPr marL="285750" indent="-285750">
+            <a:pPr marL="742950" lvl="1" indent="-285750">
               <a:buFont typeface="Arial" panose="020B0604020202020204" pitchFamily="34" charset="0"/>
               <a:buChar char="•"/>
             </a:pPr>
@@ -5363,7 +5484,7 @@
             </a:r>
           </a:p>
           <a:p>
-            <a:pPr marL="285750" indent="-285750">
+            <a:pPr marL="742950" lvl="1" indent="-285750">
               <a:buFont typeface="Arial" panose="020B0604020202020204" pitchFamily="34" charset="0"/>
               <a:buChar char="•"/>
             </a:pPr>
@@ -5373,7 +5494,7 @@
             </a:r>
           </a:p>
           <a:p>
-            <a:pPr marL="285750" indent="-285750">
+            <a:pPr marL="742950" lvl="1" indent="-285750">
               <a:buFont typeface="Arial" panose="020B0604020202020204" pitchFamily="34" charset="0"/>
               <a:buChar char="•"/>
             </a:pPr>
@@ -5383,7 +5504,7 @@
             </a:r>
           </a:p>
           <a:p>
-            <a:pPr marL="285750" indent="-285750">
+            <a:pPr marL="742950" lvl="1" indent="-285750">
               <a:buFont typeface="Arial" panose="020B0604020202020204" pitchFamily="34" charset="0"/>
               <a:buChar char="•"/>
             </a:pPr>
@@ -5440,7 +5561,7 @@
             </a:r>
           </a:p>
           <a:p>
-            <a:pPr marL="285750" indent="-285750">
+            <a:pPr marL="742950" lvl="1" indent="-285750">
               <a:buFont typeface="Arial" panose="020B0604020202020204" pitchFamily="34" charset="0"/>
               <a:buChar char="•"/>
             </a:pPr>
@@ -5448,7 +5569,6 @@
               <a:rPr lang="en-US" b="1" dirty="0"/>
               <a:t>Model deployment for marketing</a:t>
             </a:r>
-            <a:endParaRPr lang="en-US" dirty="0"/>
           </a:p>
         </p:txBody>
       </p:sp>
@@ -5467,7 +5587,7 @@
         <p:spPr>
           <a:xfrm>
             <a:off x="6449961" y="4237689"/>
-            <a:ext cx="4552336" cy="648929"/>
+            <a:ext cx="4552336" cy="975334"/>
           </a:xfrm>
           <a:prstGeom prst="roundRect">
             <a:avLst/>
@@ -5498,7 +5618,7 @@
             </a:r>
           </a:p>
           <a:p>
-            <a:pPr marL="285750" indent="-285750">
+            <a:pPr marL="742950" lvl="1" indent="-285750">
               <a:buFont typeface="Arial" panose="020B0604020202020204" pitchFamily="34" charset="0"/>
               <a:buChar char="•"/>
             </a:pPr>
@@ -5506,7 +5626,6 @@
               <a:rPr lang="en-US" b="1" dirty="0"/>
               <a:t>Data Sources and technical references</a:t>
             </a:r>
-            <a:endParaRPr lang="en-US" dirty="0"/>
           </a:p>
         </p:txBody>
       </p:sp>

</xml_diff>

<commit_message>
Added the report document in docx
</commit_message>
<xml_diff>
--- a/ML_TAKEHOME_PROJECT-REPORT.pptx
+++ b/ML_TAKEHOME_PROJECT-REPORT.pptx
@@ -5,7 +5,7 @@
     <p:sldMasterId id="2147483762" r:id="rId1"/>
   </p:sldMasterIdLst>
   <p:notesMasterIdLst>
-    <p:notesMasterId r:id="rId12"/>
+    <p:notesMasterId r:id="rId13"/>
   </p:notesMasterIdLst>
   <p:sldIdLst>
     <p:sldId id="256" r:id="rId2"/>
@@ -18,6 +18,7 @@
     <p:sldId id="264" r:id="rId9"/>
     <p:sldId id="265" r:id="rId10"/>
     <p:sldId id="266" r:id="rId11"/>
+    <p:sldId id="267" r:id="rId12"/>
   </p:sldIdLst>
   <p:sldSz cx="12192000" cy="6858000"/>
   <p:notesSz cx="6858000" cy="9144000"/>
@@ -128,7 +129,7 @@
 <p1510:revInfo xmlns:a="http://schemas.openxmlformats.org/drawingml/2006/main" xmlns:r="http://schemas.openxmlformats.org/officeDocument/2006/relationships" xmlns:p1510="http://schemas.microsoft.com/office/powerpoint/2015/10/main">
   <p1510:revLst>
     <p1510:client id="{31132351-454E-1A48-B42A-DC7063C6F178}" v="114" dt="2026-02-19T17:14:45.364"/>
-    <p1510:client id="{AE069164-220B-0049-A57E-61965DED5C62}" v="1" dt="2026-02-19T18:23:05.475"/>
+    <p1510:client id="{AE069164-220B-0049-A57E-61965DED5C62}" v="3" dt="2026-02-20T01:40:38.504"/>
     <p1510:client id="{FAE7ECCA-25BA-4320-B590-B24275B56522}" v="135" dt="2026-02-19T12:16:49.599"/>
   </p1510:revLst>
 </p1510:revInfo>
@@ -138,8 +139,8 @@
 <pc:chgInfo xmlns:a="http://schemas.openxmlformats.org/drawingml/2006/main" xmlns:r="http://schemas.openxmlformats.org/officeDocument/2006/relationships" xmlns:ac="http://schemas.microsoft.com/office/drawing/2013/main/command" xmlns:pc="http://schemas.microsoft.com/office/powerpoint/2013/main/command">
   <pc:docChgLst>
     <pc:chgData name="Edison E. Chukwuemeka" userId="211098e446733d4d" providerId="LiveId" clId="{D68C25D6-6AAD-5562-A0DF-D61B58AE280A}"/>
-    <pc:docChg chg="undo custSel modSld">
-      <pc:chgData name="Edison E. Chukwuemeka" userId="211098e446733d4d" providerId="LiveId" clId="{D68C25D6-6AAD-5562-A0DF-D61B58AE280A}" dt="2026-02-19T18:39:12.377" v="47" actId="1076"/>
+    <pc:docChg chg="undo custSel addSld modSld">
+      <pc:chgData name="Edison E. Chukwuemeka" userId="211098e446733d4d" providerId="LiveId" clId="{D68C25D6-6AAD-5562-A0DF-D61B58AE280A}" dt="2026-02-20T01:40:41.493" v="51" actId="14100"/>
       <pc:docMkLst>
         <pc:docMk/>
       </pc:docMkLst>
@@ -229,6 +230,37 @@
           </ac:spMkLst>
         </pc:spChg>
       </pc:sldChg>
+      <pc:sldChg chg="addSp modSp">
+        <pc:chgData name="Edison E. Chukwuemeka" userId="211098e446733d4d" providerId="LiveId" clId="{D68C25D6-6AAD-5562-A0DF-D61B58AE280A}" dt="2026-02-20T01:06:44.163" v="48" actId="164"/>
+        <pc:sldMkLst>
+          <pc:docMk/>
+          <pc:sldMk cId="2581846349" sldId="263"/>
+        </pc:sldMkLst>
+        <pc:grpChg chg="add mod">
+          <ac:chgData name="Edison E. Chukwuemeka" userId="211098e446733d4d" providerId="LiveId" clId="{D68C25D6-6AAD-5562-A0DF-D61B58AE280A}" dt="2026-02-20T01:06:44.163" v="48" actId="164"/>
+          <ac:grpSpMkLst>
+            <pc:docMk/>
+            <pc:sldMk cId="2581846349" sldId="263"/>
+            <ac:grpSpMk id="14" creationId="{4A02377B-1505-7080-FAFD-42C5A0C3EEC3}"/>
+          </ac:grpSpMkLst>
+        </pc:grpChg>
+        <pc:picChg chg="mod">
+          <ac:chgData name="Edison E. Chukwuemeka" userId="211098e446733d4d" providerId="LiveId" clId="{D68C25D6-6AAD-5562-A0DF-D61B58AE280A}" dt="2026-02-20T01:06:44.163" v="48" actId="164"/>
+          <ac:picMkLst>
+            <pc:docMk/>
+            <pc:sldMk cId="2581846349" sldId="263"/>
+            <ac:picMk id="21" creationId="{E3294F45-C413-FF61-C535-75602CD744D4}"/>
+          </ac:picMkLst>
+        </pc:picChg>
+        <pc:picChg chg="mod">
+          <ac:chgData name="Edison E. Chukwuemeka" userId="211098e446733d4d" providerId="LiveId" clId="{D68C25D6-6AAD-5562-A0DF-D61B58AE280A}" dt="2026-02-20T01:06:44.163" v="48" actId="164"/>
+          <ac:picMkLst>
+            <pc:docMk/>
+            <pc:sldMk cId="2581846349" sldId="263"/>
+            <ac:picMk id="23" creationId="{A63E0F08-2825-BFA7-B95C-7FF52BD68B4E}"/>
+          </ac:picMkLst>
+        </pc:picChg>
+      </pc:sldChg>
       <pc:sldChg chg="modSp mod">
         <pc:chgData name="Edison E. Chukwuemeka" userId="211098e446733d4d" providerId="LiveId" clId="{D68C25D6-6AAD-5562-A0DF-D61B58AE280A}" dt="2026-02-19T18:19:51.046" v="9" actId="113"/>
         <pc:sldMkLst>
@@ -243,6 +275,21 @@
             <ac:spMk id="2" creationId="{2CF28928-2A7A-691B-E005-844A94C34995}"/>
           </ac:spMkLst>
         </pc:spChg>
+      </pc:sldChg>
+      <pc:sldChg chg="addSp modSp new mod">
+        <pc:chgData name="Edison E. Chukwuemeka" userId="211098e446733d4d" providerId="LiveId" clId="{D68C25D6-6AAD-5562-A0DF-D61B58AE280A}" dt="2026-02-20T01:40:41.493" v="51" actId="14100"/>
+        <pc:sldMkLst>
+          <pc:docMk/>
+          <pc:sldMk cId="3014691900" sldId="267"/>
+        </pc:sldMkLst>
+        <pc:picChg chg="add mod">
+          <ac:chgData name="Edison E. Chukwuemeka" userId="211098e446733d4d" providerId="LiveId" clId="{D68C25D6-6AAD-5562-A0DF-D61B58AE280A}" dt="2026-02-20T01:40:41.493" v="51" actId="14100"/>
+          <ac:picMkLst>
+            <pc:docMk/>
+            <pc:sldMk cId="3014691900" sldId="267"/>
+            <ac:picMk id="6" creationId="{99114343-F314-E166-263C-57A2A4790734}"/>
+          </ac:picMkLst>
+        </pc:picChg>
       </pc:sldChg>
     </pc:docChg>
   </pc:docChgLst>
@@ -4956,6 +5003,183 @@
     <p:extLst>
       <p:ext uri="{BB962C8B-B14F-4D97-AF65-F5344CB8AC3E}">
         <p14:creationId xmlns:p14="http://schemas.microsoft.com/office/powerpoint/2010/main" val="471726603"/>
+      </p:ext>
+    </p:extLst>
+  </p:cSld>
+  <p:clrMapOvr>
+    <a:masterClrMapping/>
+  </p:clrMapOvr>
+</p:sld>
+</file>
+
+<file path=ppt/slides/slide11.xml><?xml version="1.0" encoding="utf-8"?>
+<p:sld xmlns:a="http://schemas.openxmlformats.org/drawingml/2006/main" xmlns:r="http://schemas.openxmlformats.org/officeDocument/2006/relationships" xmlns:p="http://schemas.openxmlformats.org/presentationml/2006/main">
+  <p:cSld>
+    <p:spTree>
+      <p:nvGrpSpPr>
+        <p:cNvPr id="1" name=""/>
+        <p:cNvGrpSpPr/>
+        <p:nvPr/>
+      </p:nvGrpSpPr>
+      <p:grpSpPr>
+        <a:xfrm>
+          <a:off x="0" y="0"/>
+          <a:ext cx="0" cy="0"/>
+          <a:chOff x="0" y="0"/>
+          <a:chExt cx="0" cy="0"/>
+        </a:xfrm>
+      </p:grpSpPr>
+      <p:sp>
+        <p:nvSpPr>
+          <p:cNvPr id="2" name="Title 1">
+            <a:extLst>
+              <a:ext uri="{FF2B5EF4-FFF2-40B4-BE49-F238E27FC236}">
+                <a16:creationId xmlns:a16="http://schemas.microsoft.com/office/drawing/2014/main" id="{D6C33D77-A422-B67D-C994-E9D8EA81BEB0}"/>
+              </a:ext>
+            </a:extLst>
+          </p:cNvPr>
+          <p:cNvSpPr>
+            <a:spLocks noGrp="1"/>
+          </p:cNvSpPr>
+          <p:nvPr>
+            <p:ph type="title"/>
+          </p:nvPr>
+        </p:nvSpPr>
+        <p:spPr/>
+        <p:txBody>
+          <a:bodyPr/>
+          <a:lstStyle/>
+          <a:p>
+            <a:endParaRPr lang="en-US"/>
+          </a:p>
+        </p:txBody>
+      </p:sp>
+      <p:sp>
+        <p:nvSpPr>
+          <p:cNvPr id="3" name="Date Placeholder 2">
+            <a:extLst>
+              <a:ext uri="{FF2B5EF4-FFF2-40B4-BE49-F238E27FC236}">
+                <a16:creationId xmlns:a16="http://schemas.microsoft.com/office/drawing/2014/main" id="{BCF7B662-258B-DD5E-F6D7-8FE6A662A2A0}"/>
+              </a:ext>
+            </a:extLst>
+          </p:cNvPr>
+          <p:cNvSpPr>
+            <a:spLocks noGrp="1"/>
+          </p:cNvSpPr>
+          <p:nvPr>
+            <p:ph type="dt" sz="half" idx="10"/>
+          </p:nvPr>
+        </p:nvSpPr>
+        <p:spPr/>
+        <p:txBody>
+          <a:bodyPr/>
+          <a:lstStyle/>
+          <a:p>
+            <a:fld id="{B2E761C5-F6CE-4AA2-94A3-15A710A0CB9E}" type="datetime1">
+              <a:rPr lang="en-US" smtClean="0"/>
+              <a:t>2/19/26</a:t>
+            </a:fld>
+            <a:endParaRPr lang="en-US"/>
+          </a:p>
+        </p:txBody>
+      </p:sp>
+      <p:sp>
+        <p:nvSpPr>
+          <p:cNvPr id="4" name="Footer Placeholder 3">
+            <a:extLst>
+              <a:ext uri="{FF2B5EF4-FFF2-40B4-BE49-F238E27FC236}">
+                <a16:creationId xmlns:a16="http://schemas.microsoft.com/office/drawing/2014/main" id="{43EBB920-AE8E-5089-BF84-6DD4811770C5}"/>
+              </a:ext>
+            </a:extLst>
+          </p:cNvPr>
+          <p:cNvSpPr>
+            <a:spLocks noGrp="1"/>
+          </p:cNvSpPr>
+          <p:nvPr>
+            <p:ph type="ftr" sz="quarter" idx="11"/>
+          </p:nvPr>
+        </p:nvSpPr>
+        <p:spPr/>
+        <p:txBody>
+          <a:bodyPr/>
+          <a:lstStyle/>
+          <a:p>
+            <a:r>
+              <a:rPr lang="en-US"/>
+              <a:t>Income Classification ML Project | Edison E Chukwuemeka</a:t>
+            </a:r>
+            <a:endParaRPr lang="en-US" sz="1100" dirty="0"/>
+          </a:p>
+        </p:txBody>
+      </p:sp>
+      <p:sp>
+        <p:nvSpPr>
+          <p:cNvPr id="5" name="Slide Number Placeholder 4">
+            <a:extLst>
+              <a:ext uri="{FF2B5EF4-FFF2-40B4-BE49-F238E27FC236}">
+                <a16:creationId xmlns:a16="http://schemas.microsoft.com/office/drawing/2014/main" id="{1EE75DCC-C03B-B00F-3E2A-D7760C13A134}"/>
+              </a:ext>
+            </a:extLst>
+          </p:cNvPr>
+          <p:cNvSpPr>
+            <a:spLocks noGrp="1"/>
+          </p:cNvSpPr>
+          <p:nvPr>
+            <p:ph type="sldNum" sz="quarter" idx="12"/>
+          </p:nvPr>
+        </p:nvSpPr>
+        <p:spPr/>
+        <p:txBody>
+          <a:bodyPr/>
+          <a:lstStyle/>
+          <a:p>
+            <a:fld id="{ACF67F9B-24B2-4C3B-9DFF-0BBDBF735F65}" type="slidenum">
+              <a:rPr lang="en-US" smtClean="0"/>
+              <a:t>11</a:t>
+            </a:fld>
+            <a:endParaRPr lang="en-US"/>
+          </a:p>
+        </p:txBody>
+      </p:sp>
+      <p:pic>
+        <p:nvPicPr>
+          <p:cNvPr id="6" name="Picture 5">
+            <a:extLst>
+              <a:ext uri="{FF2B5EF4-FFF2-40B4-BE49-F238E27FC236}">
+                <a16:creationId xmlns:a16="http://schemas.microsoft.com/office/drawing/2014/main" id="{99114343-F314-E166-263C-57A2A4790734}"/>
+              </a:ext>
+            </a:extLst>
+          </p:cNvPr>
+          <p:cNvPicPr>
+            <a:picLocks noChangeAspect="1"/>
+          </p:cNvPicPr>
+          <p:nvPr/>
+        </p:nvPicPr>
+        <p:blipFill>
+          <a:blip r:embed="rId2">
+            <a:extLst>
+              <a:ext uri="{28A0092B-C50C-407E-A947-70E740481C1C}">
+                <a14:useLocalDpi xmlns:a14="http://schemas.microsoft.com/office/drawing/2010/main" val="0"/>
+              </a:ext>
+            </a:extLst>
+          </a:blip>
+          <a:srcRect/>
+          <a:stretch/>
+        </p:blipFill>
+        <p:spPr>
+          <a:xfrm>
+            <a:off x="3503596" y="139848"/>
+            <a:ext cx="6151689" cy="6151689"/>
+          </a:xfrm>
+          <a:prstGeom prst="rect">
+            <a:avLst/>
+          </a:prstGeom>
+        </p:spPr>
+      </p:pic>
+    </p:spTree>
+    <p:extLst>
+      <p:ext uri="{BB962C8B-B14F-4D97-AF65-F5344CB8AC3E}">
+        <p14:creationId xmlns:p14="http://schemas.microsoft.com/office/powerpoint/2010/main" val="3014691900"/>
       </p:ext>
     </p:extLst>
   </p:cSld>
@@ -10700,78 +10924,99 @@
           </a:prstGeom>
         </p:spPr>
       </p:pic>
-      <p:pic>
-        <p:nvPicPr>
-          <p:cNvPr id="21" name="Picture 20">
-            <a:extLst>
-              <a:ext uri="{FF2B5EF4-FFF2-40B4-BE49-F238E27FC236}">
-                <a16:creationId xmlns:a16="http://schemas.microsoft.com/office/drawing/2014/main" id="{E3294F45-C413-FF61-C535-75602CD744D4}"/>
-              </a:ext>
-            </a:extLst>
-          </p:cNvPr>
-          <p:cNvPicPr>
-            <a:picLocks noChangeAspect="1"/>
-          </p:cNvPicPr>
+      <p:grpSp>
+        <p:nvGrpSpPr>
+          <p:cNvPr id="14" name="Group 13">
+            <a:extLst>
+              <a:ext uri="{FF2B5EF4-FFF2-40B4-BE49-F238E27FC236}">
+                <a16:creationId xmlns:a16="http://schemas.microsoft.com/office/drawing/2014/main" id="{4A02377B-1505-7080-FAFD-42C5A0C3EEC3}"/>
+              </a:ext>
+            </a:extLst>
+          </p:cNvPr>
+          <p:cNvGrpSpPr/>
           <p:nvPr/>
-        </p:nvPicPr>
-        <p:blipFill>
-          <a:blip r:embed="rId3">
-            <a:extLst>
-              <a:ext uri="{28A0092B-C50C-407E-A947-70E740481C1C}">
-                <a14:useLocalDpi xmlns:a14="http://schemas.microsoft.com/office/drawing/2010/main" val="0"/>
-              </a:ext>
-            </a:extLst>
-          </a:blip>
-          <a:stretch>
-            <a:fillRect/>
-          </a:stretch>
-        </p:blipFill>
-        <p:spPr>
+        </p:nvGrpSpPr>
+        <p:grpSpPr>
           <a:xfrm>
-            <a:off x="1109950" y="4910045"/>
-            <a:ext cx="2249521" cy="1405951"/>
+            <a:off x="1109950" y="4874302"/>
+            <a:ext cx="5282128" cy="1441694"/>
+            <a:chOff x="1109950" y="4874302"/>
+            <a:chExt cx="5282128" cy="1441694"/>
           </a:xfrm>
-          <a:prstGeom prst="rect">
-            <a:avLst/>
-          </a:prstGeom>
-        </p:spPr>
-      </p:pic>
-      <p:pic>
-        <p:nvPicPr>
-          <p:cNvPr id="23" name="Picture 22">
-            <a:extLst>
-              <a:ext uri="{FF2B5EF4-FFF2-40B4-BE49-F238E27FC236}">
-                <a16:creationId xmlns:a16="http://schemas.microsoft.com/office/drawing/2014/main" id="{A63E0F08-2825-BFA7-B95C-7FF52BD68B4E}"/>
-              </a:ext>
-            </a:extLst>
-          </p:cNvPr>
-          <p:cNvPicPr>
-            <a:picLocks noChangeAspect="1"/>
-          </p:cNvPicPr>
-          <p:nvPr/>
-        </p:nvPicPr>
-        <p:blipFill>
-          <a:blip r:embed="rId4">
-            <a:extLst>
-              <a:ext uri="{28A0092B-C50C-407E-A947-70E740481C1C}">
-                <a14:useLocalDpi xmlns:a14="http://schemas.microsoft.com/office/drawing/2010/main" val="0"/>
-              </a:ext>
-            </a:extLst>
-          </a:blip>
-          <a:stretch>
-            <a:fillRect/>
-          </a:stretch>
-        </p:blipFill>
-        <p:spPr>
-          <a:xfrm>
-            <a:off x="3508690" y="4874302"/>
-            <a:ext cx="2883388" cy="1441694"/>
-          </a:xfrm>
-          <a:prstGeom prst="rect">
-            <a:avLst/>
-          </a:prstGeom>
-        </p:spPr>
-      </p:pic>
+        </p:grpSpPr>
+        <p:pic>
+          <p:nvPicPr>
+            <p:cNvPr id="21" name="Picture 20">
+              <a:extLst>
+                <a:ext uri="{FF2B5EF4-FFF2-40B4-BE49-F238E27FC236}">
+                  <a16:creationId xmlns:a16="http://schemas.microsoft.com/office/drawing/2014/main" id="{E3294F45-C413-FF61-C535-75602CD744D4}"/>
+                </a:ext>
+              </a:extLst>
+            </p:cNvPr>
+            <p:cNvPicPr>
+              <a:picLocks noChangeAspect="1"/>
+            </p:cNvPicPr>
+            <p:nvPr/>
+          </p:nvPicPr>
+          <p:blipFill>
+            <a:blip r:embed="rId3">
+              <a:extLst>
+                <a:ext uri="{28A0092B-C50C-407E-A947-70E740481C1C}">
+                  <a14:useLocalDpi xmlns:a14="http://schemas.microsoft.com/office/drawing/2010/main" val="0"/>
+                </a:ext>
+              </a:extLst>
+            </a:blip>
+            <a:stretch>
+              <a:fillRect/>
+            </a:stretch>
+          </p:blipFill>
+          <p:spPr>
+            <a:xfrm>
+              <a:off x="1109950" y="4910045"/>
+              <a:ext cx="2249521" cy="1405951"/>
+            </a:xfrm>
+            <a:prstGeom prst="rect">
+              <a:avLst/>
+            </a:prstGeom>
+          </p:spPr>
+        </p:pic>
+        <p:pic>
+          <p:nvPicPr>
+            <p:cNvPr id="23" name="Picture 22">
+              <a:extLst>
+                <a:ext uri="{FF2B5EF4-FFF2-40B4-BE49-F238E27FC236}">
+                  <a16:creationId xmlns:a16="http://schemas.microsoft.com/office/drawing/2014/main" id="{A63E0F08-2825-BFA7-B95C-7FF52BD68B4E}"/>
+                </a:ext>
+              </a:extLst>
+            </p:cNvPr>
+            <p:cNvPicPr>
+              <a:picLocks noChangeAspect="1"/>
+            </p:cNvPicPr>
+            <p:nvPr/>
+          </p:nvPicPr>
+          <p:blipFill>
+            <a:blip r:embed="rId4">
+              <a:extLst>
+                <a:ext uri="{28A0092B-C50C-407E-A947-70E740481C1C}">
+                  <a14:useLocalDpi xmlns:a14="http://schemas.microsoft.com/office/drawing/2010/main" val="0"/>
+                </a:ext>
+              </a:extLst>
+            </a:blip>
+            <a:stretch>
+              <a:fillRect/>
+            </a:stretch>
+          </p:blipFill>
+          <p:spPr>
+            <a:xfrm>
+              <a:off x="3508690" y="4874302"/>
+              <a:ext cx="2883388" cy="1441694"/>
+            </a:xfrm>
+            <a:prstGeom prst="rect">
+              <a:avLst/>
+            </a:prstGeom>
+          </p:spPr>
+        </p:pic>
+      </p:grpSp>
       <p:pic>
         <p:nvPicPr>
           <p:cNvPr id="25" name="Picture 24">

</xml_diff>